<commit_message>
Changed presentation link to sudo.onebone.me
</commit_message>
<xml_diff>
--- a/Presentation/시공조 - 수돗물 발표 Final.pptx
+++ b/Presentation/시공조 - 수돗물 발표 Final.pptx
@@ -32,38 +32,38 @@
   <p:notesSz cx="6858000" cy="9144000"/>
   <p:embeddedFontLst>
     <p:embeddedFont>
-      <p:font typeface="Roboto Lt" pitchFamily="2" charset="0"/>
+      <p:font typeface="Roboto Condensed Light" panose="02000000000000000000" pitchFamily="2" charset="0"/>
       <p:regular r:id="rId20"/>
-      <p:italic r:id="rId21"/>
+    </p:embeddedFont>
+    <p:embeddedFont>
+      <p:font typeface="KoPub돋움체 Medium" panose="00000600000000000000" pitchFamily="2" charset="-127"/>
+      <p:regular r:id="rId21"/>
+    </p:embeddedFont>
+    <p:embeddedFont>
+      <p:font typeface="KoPub돋움체 Light" panose="00000300000000000000" pitchFamily="2" charset="-127"/>
+      <p:regular r:id="rId22"/>
+    </p:embeddedFont>
+    <p:embeddedFont>
+      <p:font typeface="Roboto Th" pitchFamily="2" charset="0"/>
+      <p:regular r:id="rId23"/>
+      <p:italic r:id="rId24"/>
+    </p:embeddedFont>
+    <p:embeddedFont>
+      <p:font typeface="맑은 고딕" panose="020B0503020000020004" pitchFamily="50" charset="-127"/>
+      <p:regular r:id="rId25"/>
+      <p:bold r:id="rId26"/>
     </p:embeddedFont>
     <p:embeddedFont>
       <p:font typeface="나눔바른고딕" panose="020B0603020101020101" pitchFamily="50" charset="-127"/>
-      <p:regular r:id="rId22"/>
-      <p:bold r:id="rId23"/>
-    </p:embeddedFont>
-    <p:embeddedFont>
-      <p:font typeface="나눔스퀘어" panose="020B0600000101010101" pitchFamily="50" charset="-127"/>
-      <p:regular r:id="rId24"/>
-    </p:embeddedFont>
-    <p:embeddedFont>
-      <p:font typeface="KoPub돋움체 Light" panose="00000300000000000000" pitchFamily="2" charset="-127"/>
-      <p:regular r:id="rId25"/>
-    </p:embeddedFont>
-    <p:embeddedFont>
-      <p:font typeface="Roboto Condensed Light" panose="02000000000000000000" pitchFamily="2" charset="0"/>
-      <p:regular r:id="rId26"/>
-    </p:embeddedFont>
-    <p:embeddedFont>
-      <p:font typeface="맑은 고딕" panose="020B0503020000020004" pitchFamily="50" charset="-127"/>
       <p:regular r:id="rId27"/>
       <p:bold r:id="rId28"/>
     </p:embeddedFont>
     <p:embeddedFont>
-      <p:font typeface="KoPub돋움체 Medium" panose="00000600000000000000" pitchFamily="2" charset="-127"/>
+      <p:font typeface="나눔스퀘어" panose="020B0600000101010101" pitchFamily="50" charset="-127"/>
       <p:regular r:id="rId29"/>
     </p:embeddedFont>
     <p:embeddedFont>
-      <p:font typeface="Roboto Th" pitchFamily="2" charset="0"/>
+      <p:font typeface="Roboto Lt" pitchFamily="2" charset="0"/>
       <p:regular r:id="rId30"/>
       <p:italic r:id="rId31"/>
     </p:embeddedFont>
@@ -7008,11 +7008,25 @@
               <a:buNone/>
             </a:pPr>
             <a:r>
-              <a:rPr lang="en-US" altLang="ko-KR" sz="2000" u="sng" dirty="0" smtClean="0">
+              <a:rPr lang="en-US" altLang="ko-KR" sz="2000" u="sng" smtClean="0">
                 <a:latin typeface="Roboto Th" pitchFamily="2" charset="0"/>
                 <a:ea typeface="Roboto Th" pitchFamily="2" charset="0"/>
               </a:rPr>
-              <a:t>https://taps.nenw.moe</a:t>
+              <a:t>https</a:t>
+            </a:r>
+            <a:r>
+              <a:rPr lang="en-US" altLang="ko-KR" sz="2000" u="sng" smtClean="0">
+                <a:latin typeface="Roboto Th" pitchFamily="2" charset="0"/>
+                <a:ea typeface="Roboto Th" pitchFamily="2" charset="0"/>
+              </a:rPr>
+              <a:t>://</a:t>
+            </a:r>
+            <a:r>
+              <a:rPr lang="en-US" altLang="ko-KR" sz="2000" u="sng" smtClean="0">
+                <a:latin typeface="Roboto Th" pitchFamily="2" charset="0"/>
+                <a:ea typeface="Roboto Th" pitchFamily="2" charset="0"/>
+              </a:rPr>
+              <a:t>sudo.onebone.me</a:t>
             </a:r>
             <a:endParaRPr lang="ko-KR" altLang="en-US" sz="2000" u="sng" dirty="0">
               <a:latin typeface="Roboto Th" pitchFamily="2" charset="0"/>

</xml_diff>